<commit_message>
speling n gramar fixez
</commit_message>
<xml_diff>
--- a/Linux/Linux_101.pptx
+++ b/Linux/Linux_101.pptx
@@ -124,6 +124,22 @@
       </a:defRPr>
     </a:lvl9pPr>
   </p:defaultTextStyle>
+  <p:extLst>
+    <p:ext uri="{EFAFB233-063F-42B5-8137-9DF3F51BA10A}">
+      <p15:sldGuideLst xmlns:p15="http://schemas.microsoft.com/office/powerpoint/2012/main">
+        <p15:guide id="1" orient="horz" pos="2160">
+          <p15:clr>
+            <a:srgbClr val="A4A3A4"/>
+          </p15:clr>
+        </p15:guide>
+        <p15:guide id="2" pos="2880">
+          <p15:clr>
+            <a:srgbClr val="A4A3A4"/>
+          </p15:clr>
+        </p15:guide>
+      </p15:sldGuideLst>
+    </p:ext>
+  </p:extLst>
 </p:presentation>
 </file>
 
@@ -3538,7 +3554,15 @@
           <a:p>
             <a:r>
               <a:rPr lang="en-US" sz="2800" dirty="0" smtClean="0"/>
-              <a:t>We are only talking command line from here out</a:t>
+              <a:t>We are only talking command line from </a:t>
+            </a:r>
+            <a:r>
+              <a:rPr lang="en-US" sz="2800" dirty="0" smtClean="0"/>
+              <a:t>here on </a:t>
+            </a:r>
+            <a:r>
+              <a:rPr lang="en-US" sz="2800" dirty="0" smtClean="0"/>
+              <a:t>out</a:t>
             </a:r>
             <a:endParaRPr lang="en-US" sz="2800" dirty="0"/>
           </a:p>
@@ -4333,7 +4357,15 @@
           <a:p>
             <a:r>
               <a:rPr lang="en-US" dirty="0" smtClean="0"/>
-              <a:t>Commands are seperated by spaces</a:t>
+              <a:t>Commands are </a:t>
+            </a:r>
+            <a:r>
+              <a:rPr lang="en-US" dirty="0" smtClean="0"/>
+              <a:t>separated </a:t>
+            </a:r>
+            <a:r>
+              <a:rPr lang="en-US" dirty="0" smtClean="0"/>
+              <a:t>by spaces</a:t>
             </a:r>
           </a:p>
           <a:p>
@@ -4381,11 +4413,7 @@
             <a:pPr lvl="1"/>
             <a:r>
               <a:rPr lang="en-US" dirty="0" smtClean="0"/>
-              <a:t>When in doubt “--help” will probably list </a:t>
-            </a:r>
-            <a:r>
-              <a:rPr lang="en-US" dirty="0" smtClean="0"/>
-              <a:t>options</a:t>
+              <a:t>When in doubt “--help” will probably list options</a:t>
             </a:r>
           </a:p>
           <a:p>
@@ -5312,7 +5340,15 @@
             </a:r>
             <a:r>
               <a:rPr lang="en-GB" sz="2400" dirty="0"/>
-              <a:t>is much more hierarcal than Windows</a:t>
+              <a:t>is much more </a:t>
+            </a:r>
+            <a:r>
+              <a:rPr lang="en-GB" sz="2400" dirty="0" smtClean="0"/>
+              <a:t>hierarchal </a:t>
+            </a:r>
+            <a:r>
+              <a:rPr lang="en-GB" sz="2400" dirty="0"/>
+              <a:t>than Windows</a:t>
             </a:r>
           </a:p>
           <a:p>
@@ -5963,13 +5999,8 @@
             <a:pPr lvl="2"/>
             <a:r>
               <a:rPr lang="en-US" dirty="0" smtClean="0"/>
-              <a:t>Stands for </a:t>
-            </a:r>
-            <a:r>
-              <a:rPr lang="en-US" dirty="0" smtClean="0"/>
-              <a:t>“shell script”</a:t>
-            </a:r>
-            <a:endParaRPr lang="en-US" dirty="0" smtClean="0"/>
+              <a:t>Stands for “shell script”</a:t>
+            </a:r>
           </a:p>
           <a:p>
             <a:endParaRPr lang="en-US" dirty="0"/>
@@ -7160,11 +7191,7 @@
             <a:pPr lvl="1"/>
             <a:r>
               <a:rPr lang="en-US" dirty="0" smtClean="0"/>
-              <a:t>Lets </a:t>
-            </a:r>
-            <a:r>
-              <a:rPr lang="en-US" dirty="0" smtClean="0"/>
-              <a:t>hardware and software communicate</a:t>
+              <a:t>Lets hardware and software communicate</a:t>
             </a:r>
           </a:p>
           <a:p>
@@ -8300,7 +8327,11 @@
           <a:p>
             <a:r>
               <a:rPr lang="en-US" dirty="0" smtClean="0"/>
-              <a:t>Acroymns Frenzy Uno</a:t>
+              <a:t>Acronyms </a:t>
+            </a:r>
+            <a:r>
+              <a:rPr lang="en-US" dirty="0" smtClean="0"/>
+              <a:t>Frenzy Uno</a:t>
             </a:r>
             <a:endParaRPr lang="en-US" dirty="0"/>
           </a:p>

</xml_diff>